<commit_message>
Swamy/az204 authenticationandauthorization 24aug2022 (#1)
* Deleted the files

* Update Demos.pptx

* Update README.md
</commit_message>
<xml_diff>
--- a/microsoft-reactor/Demos.pptx
+++ b/microsoft-reactor/Demos.pptx
@@ -274,7 +274,7 @@
           <a:p>
             <a:fld id="{3F64E90C-326F-45C8-9212-4C9C4B7EF630}" type="datetimeFigureOut">
               <a:rPr lang="en-IN" smtClean="0"/>
-              <a:t>09-08-2022</a:t>
+              <a:t>17-08-2022</a:t>
             </a:fld>
             <a:endParaRPr lang="en-IN"/>
           </a:p>
@@ -474,7 +474,7 @@
           <a:p>
             <a:fld id="{3F64E90C-326F-45C8-9212-4C9C4B7EF630}" type="datetimeFigureOut">
               <a:rPr lang="en-IN" smtClean="0"/>
-              <a:t>09-08-2022</a:t>
+              <a:t>17-08-2022</a:t>
             </a:fld>
             <a:endParaRPr lang="en-IN"/>
           </a:p>
@@ -684,7 +684,7 @@
           <a:p>
             <a:fld id="{3F64E90C-326F-45C8-9212-4C9C4B7EF630}" type="datetimeFigureOut">
               <a:rPr lang="en-IN" smtClean="0"/>
-              <a:t>09-08-2022</a:t>
+              <a:t>17-08-2022</a:t>
             </a:fld>
             <a:endParaRPr lang="en-IN"/>
           </a:p>
@@ -884,7 +884,7 @@
           <a:p>
             <a:fld id="{3F64E90C-326F-45C8-9212-4C9C4B7EF630}" type="datetimeFigureOut">
               <a:rPr lang="en-IN" smtClean="0"/>
-              <a:t>09-08-2022</a:t>
+              <a:t>17-08-2022</a:t>
             </a:fld>
             <a:endParaRPr lang="en-IN"/>
           </a:p>
@@ -1160,7 +1160,7 @@
           <a:p>
             <a:fld id="{3F64E90C-326F-45C8-9212-4C9C4B7EF630}" type="datetimeFigureOut">
               <a:rPr lang="en-IN" smtClean="0"/>
-              <a:t>09-08-2022</a:t>
+              <a:t>17-08-2022</a:t>
             </a:fld>
             <a:endParaRPr lang="en-IN"/>
           </a:p>
@@ -1428,7 +1428,7 @@
           <a:p>
             <a:fld id="{3F64E90C-326F-45C8-9212-4C9C4B7EF630}" type="datetimeFigureOut">
               <a:rPr lang="en-IN" smtClean="0"/>
-              <a:t>09-08-2022</a:t>
+              <a:t>17-08-2022</a:t>
             </a:fld>
             <a:endParaRPr lang="en-IN"/>
           </a:p>
@@ -1843,7 +1843,7 @@
           <a:p>
             <a:fld id="{3F64E90C-326F-45C8-9212-4C9C4B7EF630}" type="datetimeFigureOut">
               <a:rPr lang="en-IN" smtClean="0"/>
-              <a:t>09-08-2022</a:t>
+              <a:t>17-08-2022</a:t>
             </a:fld>
             <a:endParaRPr lang="en-IN"/>
           </a:p>
@@ -1985,7 +1985,7 @@
           <a:p>
             <a:fld id="{3F64E90C-326F-45C8-9212-4C9C4B7EF630}" type="datetimeFigureOut">
               <a:rPr lang="en-IN" smtClean="0"/>
-              <a:t>09-08-2022</a:t>
+              <a:t>17-08-2022</a:t>
             </a:fld>
             <a:endParaRPr lang="en-IN"/>
           </a:p>
@@ -2098,7 +2098,7 @@
           <a:p>
             <a:fld id="{3F64E90C-326F-45C8-9212-4C9C4B7EF630}" type="datetimeFigureOut">
               <a:rPr lang="en-IN" smtClean="0"/>
-              <a:t>09-08-2022</a:t>
+              <a:t>17-08-2022</a:t>
             </a:fld>
             <a:endParaRPr lang="en-IN"/>
           </a:p>
@@ -2411,7 +2411,7 @@
           <a:p>
             <a:fld id="{3F64E90C-326F-45C8-9212-4C9C4B7EF630}" type="datetimeFigureOut">
               <a:rPr lang="en-IN" smtClean="0"/>
-              <a:t>09-08-2022</a:t>
+              <a:t>17-08-2022</a:t>
             </a:fld>
             <a:endParaRPr lang="en-IN"/>
           </a:p>
@@ -2700,7 +2700,7 @@
           <a:p>
             <a:fld id="{3F64E90C-326F-45C8-9212-4C9C4B7EF630}" type="datetimeFigureOut">
               <a:rPr lang="en-IN" smtClean="0"/>
-              <a:t>09-08-2022</a:t>
+              <a:t>17-08-2022</a:t>
             </a:fld>
             <a:endParaRPr lang="en-IN"/>
           </a:p>
@@ -2943,7 +2943,7 @@
           <a:p>
             <a:fld id="{3F64E90C-326F-45C8-9212-4C9C4B7EF630}" type="datetimeFigureOut">
               <a:rPr lang="en-IN" smtClean="0"/>
-              <a:t>09-08-2022</a:t>
+              <a:t>17-08-2022</a:t>
             </a:fld>
             <a:endParaRPr lang="en-IN"/>
           </a:p>
@@ -3505,7 +3505,7 @@
                 <a:latin typeface="Verdana" panose="020B0604030504040204" pitchFamily="34" charset="0"/>
                 <a:ea typeface="Verdana" panose="020B0604030504040204" pitchFamily="34" charset="0"/>
               </a:rPr>
-              <a:t>10-Aug-2022</a:t>
+              <a:t>2022</a:t>
             </a:r>
           </a:p>
         </p:txBody>
@@ -9967,7 +9967,7 @@
                 <a:ea typeface="Verdana" panose="020B0604030504040204" pitchFamily="34" charset="0"/>
                 <a:cs typeface="+mn-cs"/>
               </a:rPr>
-              <a:t>28-Aug-2022</a:t>
+              <a:t>2022</a:t>
             </a:r>
           </a:p>
         </p:txBody>
@@ -10718,7 +10718,7 @@
                 <a:ea typeface="Verdana" panose="020B0604030504040204" pitchFamily="34" charset="0"/>
                 <a:cs typeface="+mn-cs"/>
               </a:rPr>
-              <a:t>08-Aug-2022</a:t>
+              <a:t>2022</a:t>
             </a:r>
           </a:p>
         </p:txBody>

</xml_diff>